<commit_message>
Update GUI-UI CubeIt 2 vystup.pptx
</commit_message>
<xml_diff>
--- a/Dokumentace/GUI-UI CubeIt 2 vystup.pptx
+++ b/Dokumentace/GUI-UI CubeIt 2 vystup.pptx
@@ -13,6 +13,10 @@
     <p:sldId id="261" r:id="rId7"/>
     <p:sldId id="262" r:id="rId8"/>
     <p:sldId id="263" r:id="rId9"/>
+    <p:sldId id="265" r:id="rId10"/>
+    <p:sldId id="264" r:id="rId11"/>
+    <p:sldId id="266" r:id="rId12"/>
+    <p:sldId id="267" r:id="rId13"/>
   </p:sldIdLst>
   <p:sldSz cx="12192000" cy="6858000"/>
   <p:notesSz cx="6858000" cy="9144000"/>
@@ -111,6 +115,11 @@
       </a:defRPr>
     </a:lvl9pPr>
   </p:defaultTextStyle>
+  <p:extLst>
+    <p:ext uri="{EFAFB233-063F-42B5-8137-9DF3F51BA10A}">
+      <p15:sldGuideLst xmlns:p15="http://schemas.microsoft.com/office/powerpoint/2012/main"/>
+    </p:ext>
+  </p:extLst>
 </p:presentation>
 </file>
 
@@ -450,7 +459,7 @@
             <a:fld id="{5923F103-BC34-4FE4-A40E-EDDEECFDA5D0}" type="datetimeFigureOut">
               <a:rPr lang="en-US" dirty="0"/>
               <a:pPr/>
-              <a:t>1/22/2019</a:t>
+              <a:t>1/23/2019</a:t>
             </a:fld>
             <a:endParaRPr lang="en-US" dirty="0"/>
           </a:p>
@@ -1538,7 +1547,7 @@
           <a:p>
             <a:fld id="{923A1CC3-2375-41D4-9E03-427CAF2A4C1A}" type="datetimeFigureOut">
               <a:rPr lang="en-US" dirty="0"/>
-              <a:t>1/22/2019</a:t>
+              <a:t>1/23/2019</a:t>
             </a:fld>
             <a:endParaRPr lang="en-US" dirty="0"/>
           </a:p>
@@ -2518,7 +2527,7 @@
           <a:p>
             <a:fld id="{AFF16868-8199-4C2C-A5B1-63AEE139F88E}" type="datetimeFigureOut">
               <a:rPr lang="en-US" dirty="0"/>
-              <a:t>1/22/2019</a:t>
+              <a:t>1/23/2019</a:t>
             </a:fld>
             <a:endParaRPr lang="en-US" dirty="0"/>
           </a:p>
@@ -3652,7 +3661,7 @@
           <a:p>
             <a:fld id="{AAD9FF7F-6988-44CC-821B-644E70CD2F73}" type="datetimeFigureOut">
               <a:rPr lang="en-US" dirty="0"/>
-              <a:t>1/22/2019</a:t>
+              <a:t>1/23/2019</a:t>
             </a:fld>
             <a:endParaRPr lang="en-US" dirty="0"/>
           </a:p>
@@ -4685,7 +4694,7 @@
           <a:p>
             <a:fld id="{5C12C299-16B2-4475-990D-751901EACC14}" type="datetimeFigureOut">
               <a:rPr lang="en-US" dirty="0"/>
-              <a:t>1/22/2019</a:t>
+              <a:t>1/23/2019</a:t>
             </a:fld>
             <a:endParaRPr lang="en-US" dirty="0"/>
           </a:p>
@@ -5345,7 +5354,7 @@
           <a:p>
             <a:fld id="{9FE86839-B9D8-4651-8783-F325ECE74E65}" type="datetimeFigureOut">
               <a:rPr lang="en-US" dirty="0"/>
-              <a:t>1/22/2019</a:t>
+              <a:t>1/23/2019</a:t>
             </a:fld>
             <a:endParaRPr lang="en-US" dirty="0"/>
           </a:p>
@@ -6206,7 +6215,7 @@
           <a:p>
             <a:fld id="{FD484F64-32F6-45C5-931F-ADC1662401D0}" type="datetimeFigureOut">
               <a:rPr lang="en-US" dirty="0"/>
-              <a:t>1/22/2019</a:t>
+              <a:t>1/23/2019</a:t>
             </a:fld>
             <a:endParaRPr lang="en-US" dirty="0"/>
           </a:p>
@@ -6396,7 +6405,7 @@
           <a:p>
             <a:fld id="{53086D93-FCAC-47E0-A2EE-787E62CA814C}" type="datetimeFigureOut">
               <a:rPr lang="en-US" dirty="0"/>
-              <a:t>1/22/2019</a:t>
+              <a:t>1/23/2019</a:t>
             </a:fld>
             <a:endParaRPr lang="en-US" dirty="0"/>
           </a:p>
@@ -7368,7 +7377,7 @@
           <a:p>
             <a:fld id="{CDA879A6-0FD0-4734-A311-86BFCA472E6E}" type="datetimeFigureOut">
               <a:rPr lang="en-US" dirty="0"/>
-              <a:t>1/22/2019</a:t>
+              <a:t>1/23/2019</a:t>
             </a:fld>
             <a:endParaRPr lang="en-US" dirty="0"/>
           </a:p>
@@ -7579,7 +7588,7 @@
           <a:p>
             <a:fld id="{19C9CA7B-DFD4-44B5-8C60-D14B8CD1FB59}" type="datetimeFigureOut">
               <a:rPr lang="en-US" dirty="0"/>
-              <a:t>1/22/2019</a:t>
+              <a:t>1/23/2019</a:t>
             </a:fld>
             <a:endParaRPr lang="en-US" dirty="0"/>
           </a:p>
@@ -8613,7 +8622,7 @@
           <a:p>
             <a:fld id="{F34E6425-0181-43F2-84FC-787E803FD2F8}" type="datetimeFigureOut">
               <a:rPr lang="en-US" dirty="0"/>
-              <a:t>1/22/2019</a:t>
+              <a:t>1/23/2019</a:t>
             </a:fld>
             <a:endParaRPr lang="en-US" dirty="0"/>
           </a:p>
@@ -8885,7 +8894,7 @@
           <a:p>
             <a:fld id="{3BDB8791-F1B0-41E7-B7FD-A781E65C4266}" type="datetimeFigureOut">
               <a:rPr lang="en-US" dirty="0"/>
-              <a:t>1/22/2019</a:t>
+              <a:t>1/23/2019</a:t>
             </a:fld>
             <a:endParaRPr lang="en-US" dirty="0"/>
           </a:p>
@@ -9295,7 +9304,7 @@
           <a:p>
             <a:fld id="{5FDD63B2-E120-4ED8-B27B-C685F510A5FE}" type="datetimeFigureOut">
               <a:rPr lang="en-US" dirty="0"/>
-              <a:t>1/22/2019</a:t>
+              <a:t>1/23/2019</a:t>
             </a:fld>
             <a:endParaRPr lang="en-US" dirty="0"/>
           </a:p>
@@ -9422,7 +9431,7 @@
           <a:p>
             <a:fld id="{7AA18ACC-A947-437B-A130-35BD54FDF1E9}" type="datetimeFigureOut">
               <a:rPr lang="en-US" dirty="0"/>
-              <a:t>1/22/2019</a:t>
+              <a:t>1/23/2019</a:t>
             </a:fld>
             <a:endParaRPr lang="en-US" dirty="0"/>
           </a:p>
@@ -9517,7 +9526,7 @@
           <a:p>
             <a:fld id="{7C8D7E02-BCB8-4D50-A234-369438C08659}" type="datetimeFigureOut">
               <a:rPr lang="en-US" dirty="0"/>
-              <a:t>1/22/2019</a:t>
+              <a:t>1/23/2019</a:t>
             </a:fld>
             <a:endParaRPr lang="en-US" dirty="0"/>
           </a:p>
@@ -10598,7 +10607,7 @@
           <a:p>
             <a:fld id="{76E86A4C-8E40-4F87-A4F0-01A0687C5742}" type="datetimeFigureOut">
               <a:rPr lang="en-US" dirty="0"/>
-              <a:t>1/22/2019</a:t>
+              <a:t>1/23/2019</a:t>
             </a:fld>
             <a:endParaRPr lang="en-US" dirty="0"/>
           </a:p>
@@ -11706,7 +11715,7 @@
           <a:p>
             <a:fld id="{35E72C73-2D91-4E12-BA25-F0AA0C03599B}" type="datetimeFigureOut">
               <a:rPr lang="en-US" dirty="0"/>
-              <a:t>1/22/2019</a:t>
+              <a:t>1/23/2019</a:t>
             </a:fld>
             <a:endParaRPr lang="en-US" dirty="0"/>
           </a:p>
@@ -12703,7 +12712,7 @@
           <a:p>
             <a:fld id="{2BE451C3-0FF4-47C4-B829-773ADF60F88C}" type="datetimeFigureOut">
               <a:rPr lang="en-US" dirty="0"/>
-              <a:t>1/22/2019</a:t>
+              <a:t>1/23/2019</a:t>
             </a:fld>
             <a:endParaRPr lang="en-US" dirty="0"/>
           </a:p>
@@ -13725,24 +13734,21 @@
                   <a:schemeClr val="tx1"/>
                 </a:solidFill>
               </a:rPr>
-              <a:t> </a:t>
+              <a:t> G</a:t>
             </a:r>
             <a:r>
-              <a:rPr lang="en-US" sz="5400" dirty="0" err="1">
+              <a:rPr lang="cs-CZ" sz="5400" dirty="0">
                 <a:solidFill>
                   <a:schemeClr val="tx1"/>
                 </a:solidFill>
               </a:rPr>
-              <a:t>Gui</a:t>
+              <a:t>UI,UI</a:t>
             </a:r>
-            <a:r>
-              <a:rPr lang="en-US" sz="5400" dirty="0">
-                <a:solidFill>
-                  <a:schemeClr val="tx1"/>
-                </a:solidFill>
-              </a:rPr>
-              <a:t>/Ui</a:t>
-            </a:r>
+            <a:endParaRPr lang="en-US" sz="5400" dirty="0">
+              <a:solidFill>
+                <a:schemeClr val="tx1"/>
+              </a:solidFill>
+            </a:endParaRPr>
           </a:p>
         </p:txBody>
       </p:sp>
@@ -13810,6 +13816,657 @@
   </p:cSld>
   <p:clrMapOvr>
     <a:overrideClrMapping bg1="dk1" tx1="lt1" bg2="dk2" tx2="lt2" accent1="accent1" accent2="accent2" accent3="accent3" accent4="accent4" accent5="accent5" accent6="accent6" hlink="hlink" folHlink="folHlink"/>
+  </p:clrMapOvr>
+</p:sld>
+</file>
+
+<file path=ppt/slides/slide10.xml><?xml version="1.0" encoding="utf-8"?>
+<p:sld xmlns:a="http://schemas.openxmlformats.org/drawingml/2006/main" xmlns:r="http://schemas.openxmlformats.org/officeDocument/2006/relationships" xmlns:p="http://schemas.openxmlformats.org/presentationml/2006/main">
+  <p:cSld>
+    <p:spTree>
+      <p:nvGrpSpPr>
+        <p:cNvPr id="1" name=""/>
+        <p:cNvGrpSpPr/>
+        <p:nvPr/>
+      </p:nvGrpSpPr>
+      <p:grpSpPr>
+        <a:xfrm>
+          <a:off x="0" y="0"/>
+          <a:ext cx="0" cy="0"/>
+          <a:chOff x="0" y="0"/>
+          <a:chExt cx="0" cy="0"/>
+        </a:xfrm>
+      </p:grpSpPr>
+      <p:sp>
+        <p:nvSpPr>
+          <p:cNvPr id="2" name="Nadpis 1">
+            <a:extLst>
+              <a:ext uri="{FF2B5EF4-FFF2-40B4-BE49-F238E27FC236}">
+                <a16:creationId xmlns:a16="http://schemas.microsoft.com/office/drawing/2014/main" id="{44BD41AC-BC55-4C4C-9C7D-8B6F964E982D}"/>
+              </a:ext>
+            </a:extLst>
+          </p:cNvPr>
+          <p:cNvSpPr>
+            <a:spLocks noGrp="1"/>
+          </p:cNvSpPr>
+          <p:nvPr>
+            <p:ph type="title"/>
+          </p:nvPr>
+        </p:nvSpPr>
+        <p:spPr/>
+        <p:txBody>
+          <a:bodyPr/>
+          <a:lstStyle/>
+          <a:p>
+            <a:r>
+              <a:rPr lang="cs-CZ" dirty="0"/>
+              <a:t>Pozadí </a:t>
+            </a:r>
+          </a:p>
+        </p:txBody>
+      </p:sp>
+      <p:pic>
+        <p:nvPicPr>
+          <p:cNvPr id="5" name="Zástupný obsah 4" descr="Obsah obrázku červená, obloha&#10;&#10;Popis se vygeneroval automaticky.">
+            <a:extLst>
+              <a:ext uri="{FF2B5EF4-FFF2-40B4-BE49-F238E27FC236}">
+                <a16:creationId xmlns:a16="http://schemas.microsoft.com/office/drawing/2014/main" id="{E6DA0E7D-FAE4-471D-8172-61638D5644A3}"/>
+              </a:ext>
+            </a:extLst>
+          </p:cNvPr>
+          <p:cNvPicPr>
+            <a:picLocks noGrp="1" noChangeAspect="1"/>
+          </p:cNvPicPr>
+          <p:nvPr>
+            <p:ph idx="1"/>
+          </p:nvPr>
+        </p:nvPicPr>
+        <p:blipFill>
+          <a:blip r:embed="rId2"/>
+          <a:stretch>
+            <a:fillRect/>
+          </a:stretch>
+        </p:blipFill>
+        <p:spPr>
+          <a:xfrm>
+            <a:off x="7976588" y="4682646"/>
+            <a:ext cx="2971070" cy="1671903"/>
+          </a:xfrm>
+        </p:spPr>
+      </p:pic>
+      <p:pic>
+        <p:nvPicPr>
+          <p:cNvPr id="7" name="Obrázek 6" descr="Obsah obrázku obloha, budova&#10;&#10;Popis se vygeneroval automaticky.">
+            <a:extLst>
+              <a:ext uri="{FF2B5EF4-FFF2-40B4-BE49-F238E27FC236}">
+                <a16:creationId xmlns:a16="http://schemas.microsoft.com/office/drawing/2014/main" id="{7FDE72F0-6AA0-4021-8F7A-DFD7DEE8CAAB}"/>
+              </a:ext>
+            </a:extLst>
+          </p:cNvPr>
+          <p:cNvPicPr>
+            <a:picLocks noChangeAspect="1"/>
+          </p:cNvPicPr>
+          <p:nvPr/>
+        </p:nvPicPr>
+        <p:blipFill>
+          <a:blip r:embed="rId3"/>
+          <a:stretch>
+            <a:fillRect/>
+          </a:stretch>
+        </p:blipFill>
+        <p:spPr>
+          <a:xfrm>
+            <a:off x="4452189" y="4682646"/>
+            <a:ext cx="2972272" cy="1671903"/>
+          </a:xfrm>
+          <a:prstGeom prst="rect">
+            <a:avLst/>
+          </a:prstGeom>
+        </p:spPr>
+      </p:pic>
+      <p:pic>
+        <p:nvPicPr>
+          <p:cNvPr id="9" name="Obrázek 8">
+            <a:extLst>
+              <a:ext uri="{FF2B5EF4-FFF2-40B4-BE49-F238E27FC236}">
+                <a16:creationId xmlns:a16="http://schemas.microsoft.com/office/drawing/2014/main" id="{4E74D1C0-0B39-4625-855D-B1170DF7FF2F}"/>
+              </a:ext>
+            </a:extLst>
+          </p:cNvPr>
+          <p:cNvPicPr>
+            <a:picLocks noChangeAspect="1"/>
+          </p:cNvPicPr>
+          <p:nvPr/>
+        </p:nvPicPr>
+        <p:blipFill>
+          <a:blip r:embed="rId4"/>
+          <a:stretch>
+            <a:fillRect/>
+          </a:stretch>
+        </p:blipFill>
+        <p:spPr>
+          <a:xfrm>
+            <a:off x="1029809" y="2517549"/>
+            <a:ext cx="2971070" cy="1669487"/>
+          </a:xfrm>
+          <a:prstGeom prst="rect">
+            <a:avLst/>
+          </a:prstGeom>
+        </p:spPr>
+      </p:pic>
+      <p:pic>
+        <p:nvPicPr>
+          <p:cNvPr id="11" name="Obrázek 10">
+            <a:extLst>
+              <a:ext uri="{FF2B5EF4-FFF2-40B4-BE49-F238E27FC236}">
+                <a16:creationId xmlns:a16="http://schemas.microsoft.com/office/drawing/2014/main" id="{3F569209-D2D3-4A9D-95C4-901A72C2E3BA}"/>
+              </a:ext>
+            </a:extLst>
+          </p:cNvPr>
+          <p:cNvPicPr>
+            <a:picLocks noChangeAspect="1"/>
+          </p:cNvPicPr>
+          <p:nvPr/>
+        </p:nvPicPr>
+        <p:blipFill>
+          <a:blip r:embed="rId5"/>
+          <a:stretch>
+            <a:fillRect/>
+          </a:stretch>
+        </p:blipFill>
+        <p:spPr>
+          <a:xfrm>
+            <a:off x="1029810" y="4682210"/>
+            <a:ext cx="2971069" cy="1672774"/>
+          </a:xfrm>
+          <a:prstGeom prst="rect">
+            <a:avLst/>
+          </a:prstGeom>
+        </p:spPr>
+      </p:pic>
+      <p:pic>
+        <p:nvPicPr>
+          <p:cNvPr id="13" name="Obrázek 12" descr="Obsah obrázku text&#10;&#10;Popis se vygeneroval automaticky.">
+            <a:extLst>
+              <a:ext uri="{FF2B5EF4-FFF2-40B4-BE49-F238E27FC236}">
+                <a16:creationId xmlns:a16="http://schemas.microsoft.com/office/drawing/2014/main" id="{29ED3B3E-EF76-4AA3-9648-9DFF0E49BAC7}"/>
+              </a:ext>
+            </a:extLst>
+          </p:cNvPr>
+          <p:cNvPicPr>
+            <a:picLocks noChangeAspect="1"/>
+          </p:cNvPicPr>
+          <p:nvPr/>
+        </p:nvPicPr>
+        <p:blipFill>
+          <a:blip r:embed="rId6"/>
+          <a:stretch>
+            <a:fillRect/>
+          </a:stretch>
+        </p:blipFill>
+        <p:spPr>
+          <a:xfrm>
+            <a:off x="4452189" y="2517549"/>
+            <a:ext cx="2971069" cy="1670357"/>
+          </a:xfrm>
+          <a:prstGeom prst="rect">
+            <a:avLst/>
+          </a:prstGeom>
+        </p:spPr>
+      </p:pic>
+      <p:pic>
+        <p:nvPicPr>
+          <p:cNvPr id="15" name="Obrázek 14" descr="Obsah obrázku mapa&#10;&#10;Popis se vygeneroval automaticky.">
+            <a:extLst>
+              <a:ext uri="{FF2B5EF4-FFF2-40B4-BE49-F238E27FC236}">
+                <a16:creationId xmlns:a16="http://schemas.microsoft.com/office/drawing/2014/main" id="{0799C7B5-EF21-488F-A77A-1D23FAA81A11}"/>
+              </a:ext>
+            </a:extLst>
+          </p:cNvPr>
+          <p:cNvPicPr>
+            <a:picLocks noChangeAspect="1"/>
+          </p:cNvPicPr>
+          <p:nvPr/>
+        </p:nvPicPr>
+        <p:blipFill>
+          <a:blip r:embed="rId7"/>
+          <a:stretch>
+            <a:fillRect/>
+          </a:stretch>
+        </p:blipFill>
+        <p:spPr>
+          <a:xfrm>
+            <a:off x="7976588" y="2515133"/>
+            <a:ext cx="2971070" cy="1671903"/>
+          </a:xfrm>
+          <a:prstGeom prst="rect">
+            <a:avLst/>
+          </a:prstGeom>
+        </p:spPr>
+      </p:pic>
+    </p:spTree>
+    <p:extLst>
+      <p:ext uri="{BB962C8B-B14F-4D97-AF65-F5344CB8AC3E}">
+        <p14:creationId xmlns:p14="http://schemas.microsoft.com/office/powerpoint/2010/main" val="3402909933"/>
+      </p:ext>
+    </p:extLst>
+  </p:cSld>
+  <p:clrMapOvr>
+    <a:masterClrMapping/>
+  </p:clrMapOvr>
+</p:sld>
+</file>
+
+<file path=ppt/slides/slide11.xml><?xml version="1.0" encoding="utf-8"?>
+<p:sld xmlns:a="http://schemas.openxmlformats.org/drawingml/2006/main" xmlns:r="http://schemas.openxmlformats.org/officeDocument/2006/relationships" xmlns:p="http://schemas.openxmlformats.org/presentationml/2006/main">
+  <p:cSld>
+    <p:spTree>
+      <p:nvGrpSpPr>
+        <p:cNvPr id="1" name=""/>
+        <p:cNvGrpSpPr/>
+        <p:nvPr/>
+      </p:nvGrpSpPr>
+      <p:grpSpPr>
+        <a:xfrm>
+          <a:off x="0" y="0"/>
+          <a:ext cx="0" cy="0"/>
+          <a:chOff x="0" y="0"/>
+          <a:chExt cx="0" cy="0"/>
+        </a:xfrm>
+      </p:grpSpPr>
+      <p:sp>
+        <p:nvSpPr>
+          <p:cNvPr id="2" name="Nadpis 1">
+            <a:extLst>
+              <a:ext uri="{FF2B5EF4-FFF2-40B4-BE49-F238E27FC236}">
+                <a16:creationId xmlns:a16="http://schemas.microsoft.com/office/drawing/2014/main" id="{CC78F9F8-A095-4951-AA94-BA142CA84AAC}"/>
+              </a:ext>
+            </a:extLst>
+          </p:cNvPr>
+          <p:cNvSpPr>
+            <a:spLocks noGrp="1"/>
+          </p:cNvSpPr>
+          <p:nvPr>
+            <p:ph type="title"/>
+          </p:nvPr>
+        </p:nvSpPr>
+        <p:spPr/>
+        <p:txBody>
+          <a:bodyPr/>
+          <a:lstStyle/>
+          <a:p>
+            <a:r>
+              <a:rPr lang="cs-CZ" dirty="0"/>
+              <a:t>Mapy</a:t>
+            </a:r>
+          </a:p>
+        </p:txBody>
+      </p:sp>
+      <p:pic>
+        <p:nvPicPr>
+          <p:cNvPr id="5" name="Zástupný obsah 4">
+            <a:extLst>
+              <a:ext uri="{FF2B5EF4-FFF2-40B4-BE49-F238E27FC236}">
+                <a16:creationId xmlns:a16="http://schemas.microsoft.com/office/drawing/2014/main" id="{7A3F26D6-C7D6-48FE-A938-C65A968B0D9B}"/>
+              </a:ext>
+            </a:extLst>
+          </p:cNvPr>
+          <p:cNvPicPr>
+            <a:picLocks noGrp="1" noChangeAspect="1"/>
+          </p:cNvPicPr>
+          <p:nvPr>
+            <p:ph idx="1"/>
+          </p:nvPr>
+        </p:nvPicPr>
+        <p:blipFill>
+          <a:blip r:embed="rId2"/>
+          <a:stretch>
+            <a:fillRect/>
+          </a:stretch>
+        </p:blipFill>
+        <p:spPr>
+          <a:xfrm>
+            <a:off x="4298273" y="4649052"/>
+            <a:ext cx="3371512" cy="1898232"/>
+          </a:xfrm>
+        </p:spPr>
+      </p:pic>
+      <p:pic>
+        <p:nvPicPr>
+          <p:cNvPr id="7" name="Obrázek 6">
+            <a:extLst>
+              <a:ext uri="{FF2B5EF4-FFF2-40B4-BE49-F238E27FC236}">
+                <a16:creationId xmlns:a16="http://schemas.microsoft.com/office/drawing/2014/main" id="{03290D31-3F36-4800-82CC-5DB50F1CCBF1}"/>
+              </a:ext>
+            </a:extLst>
+          </p:cNvPr>
+          <p:cNvPicPr>
+            <a:picLocks noChangeAspect="1"/>
+          </p:cNvPicPr>
+          <p:nvPr/>
+        </p:nvPicPr>
+        <p:blipFill>
+          <a:blip r:embed="rId3"/>
+          <a:stretch>
+            <a:fillRect/>
+          </a:stretch>
+        </p:blipFill>
+        <p:spPr>
+          <a:xfrm>
+            <a:off x="4333461" y="2503502"/>
+            <a:ext cx="3374632" cy="1898230"/>
+          </a:xfrm>
+          <a:prstGeom prst="rect">
+            <a:avLst/>
+          </a:prstGeom>
+        </p:spPr>
+      </p:pic>
+      <p:pic>
+        <p:nvPicPr>
+          <p:cNvPr id="9" name="Obrázek 8">
+            <a:extLst>
+              <a:ext uri="{FF2B5EF4-FFF2-40B4-BE49-F238E27FC236}">
+                <a16:creationId xmlns:a16="http://schemas.microsoft.com/office/drawing/2014/main" id="{559EF013-FA1A-46A1-BB5C-9A53C4260CFB}"/>
+              </a:ext>
+            </a:extLst>
+          </p:cNvPr>
+          <p:cNvPicPr>
+            <a:picLocks noChangeAspect="1"/>
+          </p:cNvPicPr>
+          <p:nvPr/>
+        </p:nvPicPr>
+        <p:blipFill>
+          <a:blip r:embed="rId4"/>
+          <a:stretch>
+            <a:fillRect/>
+          </a:stretch>
+        </p:blipFill>
+        <p:spPr>
+          <a:xfrm>
+            <a:off x="586658" y="2503503"/>
+            <a:ext cx="3374630" cy="1898229"/>
+          </a:xfrm>
+          <a:prstGeom prst="rect">
+            <a:avLst/>
+          </a:prstGeom>
+        </p:spPr>
+      </p:pic>
+      <p:pic>
+        <p:nvPicPr>
+          <p:cNvPr id="11" name="Obrázek 10" descr="Obsah obrázku objekt&#10;&#10;Popis se vygeneroval automaticky.">
+            <a:extLst>
+              <a:ext uri="{FF2B5EF4-FFF2-40B4-BE49-F238E27FC236}">
+                <a16:creationId xmlns:a16="http://schemas.microsoft.com/office/drawing/2014/main" id="{110A87B9-41C7-4700-8ED7-E206D765ED91}"/>
+              </a:ext>
+            </a:extLst>
+          </p:cNvPr>
+          <p:cNvPicPr>
+            <a:picLocks noChangeAspect="1"/>
+          </p:cNvPicPr>
+          <p:nvPr/>
+        </p:nvPicPr>
+        <p:blipFill>
+          <a:blip r:embed="rId5"/>
+          <a:stretch>
+            <a:fillRect/>
+          </a:stretch>
+        </p:blipFill>
+        <p:spPr>
+          <a:xfrm>
+            <a:off x="599133" y="4649052"/>
+            <a:ext cx="3368392" cy="1898230"/>
+          </a:xfrm>
+          <a:prstGeom prst="rect">
+            <a:avLst/>
+          </a:prstGeom>
+        </p:spPr>
+      </p:pic>
+      <p:pic>
+        <p:nvPicPr>
+          <p:cNvPr id="13" name="Obrázek 12">
+            <a:extLst>
+              <a:ext uri="{FF2B5EF4-FFF2-40B4-BE49-F238E27FC236}">
+                <a16:creationId xmlns:a16="http://schemas.microsoft.com/office/drawing/2014/main" id="{F50AD925-453A-4C37-AD80-B1AE01CA785C}"/>
+              </a:ext>
+            </a:extLst>
+          </p:cNvPr>
+          <p:cNvPicPr>
+            <a:picLocks noChangeAspect="1"/>
+          </p:cNvPicPr>
+          <p:nvPr/>
+        </p:nvPicPr>
+        <p:blipFill>
+          <a:blip r:embed="rId6"/>
+          <a:stretch>
+            <a:fillRect/>
+          </a:stretch>
+        </p:blipFill>
+        <p:spPr>
+          <a:xfrm>
+            <a:off x="8000533" y="4649053"/>
+            <a:ext cx="3368393" cy="1898229"/>
+          </a:xfrm>
+          <a:prstGeom prst="rect">
+            <a:avLst/>
+          </a:prstGeom>
+        </p:spPr>
+      </p:pic>
+      <p:pic>
+        <p:nvPicPr>
+          <p:cNvPr id="15" name="Obrázek 14" descr="Obsah obrázku text&#10;&#10;Popis se vygeneroval automaticky.">
+            <a:extLst>
+              <a:ext uri="{FF2B5EF4-FFF2-40B4-BE49-F238E27FC236}">
+                <a16:creationId xmlns:a16="http://schemas.microsoft.com/office/drawing/2014/main" id="{CE1B3CBF-FCE4-40DF-B060-F9B384665834}"/>
+              </a:ext>
+            </a:extLst>
+          </p:cNvPr>
+          <p:cNvPicPr>
+            <a:picLocks noChangeAspect="1"/>
+          </p:cNvPicPr>
+          <p:nvPr/>
+        </p:nvPicPr>
+        <p:blipFill>
+          <a:blip r:embed="rId7"/>
+          <a:stretch>
+            <a:fillRect/>
+          </a:stretch>
+        </p:blipFill>
+        <p:spPr>
+          <a:xfrm>
+            <a:off x="7994296" y="2503503"/>
+            <a:ext cx="3374630" cy="1898229"/>
+          </a:xfrm>
+          <a:prstGeom prst="rect">
+            <a:avLst/>
+          </a:prstGeom>
+        </p:spPr>
+      </p:pic>
+    </p:spTree>
+    <p:extLst>
+      <p:ext uri="{BB962C8B-B14F-4D97-AF65-F5344CB8AC3E}">
+        <p14:creationId xmlns:p14="http://schemas.microsoft.com/office/powerpoint/2010/main" val="565579071"/>
+      </p:ext>
+    </p:extLst>
+  </p:cSld>
+  <p:clrMapOvr>
+    <a:masterClrMapping/>
+  </p:clrMapOvr>
+</p:sld>
+</file>
+
+<file path=ppt/slides/slide12.xml><?xml version="1.0" encoding="utf-8"?>
+<p:sld xmlns:a="http://schemas.openxmlformats.org/drawingml/2006/main" xmlns:r="http://schemas.openxmlformats.org/officeDocument/2006/relationships" xmlns:p="http://schemas.openxmlformats.org/presentationml/2006/main">
+  <p:cSld>
+    <p:spTree>
+      <p:nvGrpSpPr>
+        <p:cNvPr id="1" name=""/>
+        <p:cNvGrpSpPr/>
+        <p:nvPr/>
+      </p:nvGrpSpPr>
+      <p:grpSpPr>
+        <a:xfrm>
+          <a:off x="0" y="0"/>
+          <a:ext cx="0" cy="0"/>
+          <a:chOff x="0" y="0"/>
+          <a:chExt cx="0" cy="0"/>
+        </a:xfrm>
+      </p:grpSpPr>
+      <p:sp>
+        <p:nvSpPr>
+          <p:cNvPr id="2" name="Nadpis 1">
+            <a:extLst>
+              <a:ext uri="{FF2B5EF4-FFF2-40B4-BE49-F238E27FC236}">
+                <a16:creationId xmlns:a16="http://schemas.microsoft.com/office/drawing/2014/main" id="{7296C614-0F5B-42D8-A7CB-79B3BCD0131F}"/>
+              </a:ext>
+            </a:extLst>
+          </p:cNvPr>
+          <p:cNvSpPr>
+            <a:spLocks noGrp="1"/>
+          </p:cNvSpPr>
+          <p:nvPr>
+            <p:ph type="title"/>
+          </p:nvPr>
+        </p:nvSpPr>
+        <p:spPr/>
+        <p:txBody>
+          <a:bodyPr/>
+          <a:lstStyle/>
+          <a:p>
+            <a:r>
+              <a:rPr lang="cs-CZ" dirty="0"/>
+              <a:t>Postavy </a:t>
+            </a:r>
+          </a:p>
+        </p:txBody>
+      </p:sp>
+      <p:pic>
+        <p:nvPicPr>
+          <p:cNvPr id="5" name="Zástupný obsah 4">
+            <a:extLst>
+              <a:ext uri="{FF2B5EF4-FFF2-40B4-BE49-F238E27FC236}">
+                <a16:creationId xmlns:a16="http://schemas.microsoft.com/office/drawing/2014/main" id="{195EFF53-1624-464D-BB1E-5FC2BCBA3395}"/>
+              </a:ext>
+            </a:extLst>
+          </p:cNvPr>
+          <p:cNvPicPr>
+            <a:picLocks noGrp="1" noChangeAspect="1"/>
+          </p:cNvPicPr>
+          <p:nvPr>
+            <p:ph idx="1"/>
+          </p:nvPr>
+        </p:nvPicPr>
+        <p:blipFill>
+          <a:blip r:embed="rId2"/>
+          <a:stretch>
+            <a:fillRect/>
+          </a:stretch>
+        </p:blipFill>
+        <p:spPr>
+          <a:xfrm>
+            <a:off x="8942458" y="3087508"/>
+            <a:ext cx="1771934" cy="3657040"/>
+          </a:xfrm>
+        </p:spPr>
+      </p:pic>
+      <p:pic>
+        <p:nvPicPr>
+          <p:cNvPr id="7" name="Obrázek 6">
+            <a:extLst>
+              <a:ext uri="{FF2B5EF4-FFF2-40B4-BE49-F238E27FC236}">
+                <a16:creationId xmlns:a16="http://schemas.microsoft.com/office/drawing/2014/main" id="{B9DEDF4B-4AE1-46AE-AFEA-AFCDD4DCCD24}"/>
+              </a:ext>
+            </a:extLst>
+          </p:cNvPr>
+          <p:cNvPicPr>
+            <a:picLocks noChangeAspect="1"/>
+          </p:cNvPicPr>
+          <p:nvPr/>
+        </p:nvPicPr>
+        <p:blipFill>
+          <a:blip r:embed="rId3"/>
+          <a:stretch>
+            <a:fillRect/>
+          </a:stretch>
+        </p:blipFill>
+        <p:spPr>
+          <a:xfrm>
+            <a:off x="5974580" y="1452880"/>
+            <a:ext cx="2554912" cy="5291668"/>
+          </a:xfrm>
+          <a:prstGeom prst="rect">
+            <a:avLst/>
+          </a:prstGeom>
+        </p:spPr>
+      </p:pic>
+      <p:pic>
+        <p:nvPicPr>
+          <p:cNvPr id="9" name="Obrázek 8" descr="Obsah obrázku objekt&#10;&#10;Popis se vygeneroval automaticky.">
+            <a:extLst>
+              <a:ext uri="{FF2B5EF4-FFF2-40B4-BE49-F238E27FC236}">
+                <a16:creationId xmlns:a16="http://schemas.microsoft.com/office/drawing/2014/main" id="{A2176728-C813-4C15-A5D7-F948F5456180}"/>
+              </a:ext>
+            </a:extLst>
+          </p:cNvPr>
+          <p:cNvPicPr>
+            <a:picLocks noChangeAspect="1"/>
+          </p:cNvPicPr>
+          <p:nvPr/>
+        </p:nvPicPr>
+        <p:blipFill>
+          <a:blip r:embed="rId4"/>
+          <a:stretch>
+            <a:fillRect/>
+          </a:stretch>
+        </p:blipFill>
+        <p:spPr>
+          <a:xfrm>
+            <a:off x="4187371" y="2379875"/>
+            <a:ext cx="1979749" cy="4364673"/>
+          </a:xfrm>
+          <a:prstGeom prst="rect">
+            <a:avLst/>
+          </a:prstGeom>
+        </p:spPr>
+      </p:pic>
+      <p:pic>
+        <p:nvPicPr>
+          <p:cNvPr id="11" name="Obrázek 10">
+            <a:extLst>
+              <a:ext uri="{FF2B5EF4-FFF2-40B4-BE49-F238E27FC236}">
+                <a16:creationId xmlns:a16="http://schemas.microsoft.com/office/drawing/2014/main" id="{61CA1BD3-95F8-4DD4-9E8E-A496EACD2B9E}"/>
+              </a:ext>
+            </a:extLst>
+          </p:cNvPr>
+          <p:cNvPicPr>
+            <a:picLocks noChangeAspect="1"/>
+          </p:cNvPicPr>
+          <p:nvPr/>
+        </p:nvPicPr>
+        <p:blipFill>
+          <a:blip r:embed="rId5"/>
+          <a:stretch>
+            <a:fillRect/>
+          </a:stretch>
+        </p:blipFill>
+        <p:spPr>
+          <a:xfrm>
+            <a:off x="970316" y="2378974"/>
+            <a:ext cx="2819364" cy="4365574"/>
+          </a:xfrm>
+          <a:prstGeom prst="rect">
+            <a:avLst/>
+          </a:prstGeom>
+        </p:spPr>
+      </p:pic>
+    </p:spTree>
+    <p:extLst>
+      <p:ext uri="{BB962C8B-B14F-4D97-AF65-F5344CB8AC3E}">
+        <p14:creationId xmlns:p14="http://schemas.microsoft.com/office/powerpoint/2010/main" val="1954681882"/>
+      </p:ext>
+    </p:extLst>
+  </p:cSld>
+  <p:clrMapOvr>
+    <a:masterClrMapping/>
   </p:clrMapOvr>
 </p:sld>
 </file>
@@ -18145,7 +18802,7 @@
                   <a:srgbClr val="FFFFFF"/>
                 </a:solidFill>
               </a:rPr>
-              <a:t>Jsou dány tak aby uživatel mohl vidět na zajímavou lokaci.</a:t>
+              <a:t>Jsou rozmístěny tak, aby uživatel mohl vidět na zajímavou část mapy.</a:t>
             </a:r>
           </a:p>
         </p:txBody>
@@ -18237,6 +18894,110 @@
     <p:extLst>
       <p:ext uri="{BB962C8B-B14F-4D97-AF65-F5344CB8AC3E}">
         <p14:creationId xmlns:p14="http://schemas.microsoft.com/office/powerpoint/2010/main" val="3436524233"/>
+      </p:ext>
+    </p:extLst>
+  </p:cSld>
+  <p:clrMapOvr>
+    <a:masterClrMapping/>
+  </p:clrMapOvr>
+</p:sld>
+</file>
+
+<file path=ppt/slides/slide9.xml><?xml version="1.0" encoding="utf-8"?>
+<p:sld xmlns:a="http://schemas.openxmlformats.org/drawingml/2006/main" xmlns:r="http://schemas.openxmlformats.org/officeDocument/2006/relationships" xmlns:p="http://schemas.openxmlformats.org/presentationml/2006/main">
+  <p:cSld>
+    <p:spTree>
+      <p:nvGrpSpPr>
+        <p:cNvPr id="1" name=""/>
+        <p:cNvGrpSpPr/>
+        <p:nvPr/>
+      </p:nvGrpSpPr>
+      <p:grpSpPr>
+        <a:xfrm>
+          <a:off x="0" y="0"/>
+          <a:ext cx="0" cy="0"/>
+          <a:chOff x="0" y="0"/>
+          <a:chExt cx="0" cy="0"/>
+        </a:xfrm>
+      </p:grpSpPr>
+      <p:sp>
+        <p:nvSpPr>
+          <p:cNvPr id="2" name="Nadpis 1">
+            <a:extLst>
+              <a:ext uri="{FF2B5EF4-FFF2-40B4-BE49-F238E27FC236}">
+                <a16:creationId xmlns:a16="http://schemas.microsoft.com/office/drawing/2014/main" id="{7954515D-911F-4B22-9626-3EFD10CBA15C}"/>
+              </a:ext>
+            </a:extLst>
+          </p:cNvPr>
+          <p:cNvSpPr>
+            <a:spLocks noGrp="1"/>
+          </p:cNvSpPr>
+          <p:nvPr>
+            <p:ph type="title"/>
+          </p:nvPr>
+        </p:nvSpPr>
+        <p:spPr/>
+        <p:txBody>
+          <a:bodyPr/>
+          <a:lstStyle/>
+          <a:p>
+            <a:r>
+              <a:rPr lang="cs-CZ" dirty="0"/>
+              <a:t>Grafika </a:t>
+            </a:r>
+          </a:p>
+        </p:txBody>
+      </p:sp>
+      <p:sp>
+        <p:nvSpPr>
+          <p:cNvPr id="3" name="Zástupný obsah 2">
+            <a:extLst>
+              <a:ext uri="{FF2B5EF4-FFF2-40B4-BE49-F238E27FC236}">
+                <a16:creationId xmlns:a16="http://schemas.microsoft.com/office/drawing/2014/main" id="{CA3EBC17-E07E-4282-B753-759808A01BB1}"/>
+              </a:ext>
+            </a:extLst>
+          </p:cNvPr>
+          <p:cNvSpPr>
+            <a:spLocks noGrp="1"/>
+          </p:cNvSpPr>
+          <p:nvPr>
+            <p:ph idx="1"/>
+          </p:nvPr>
+        </p:nvSpPr>
+        <p:spPr/>
+        <p:txBody>
+          <a:bodyPr/>
+          <a:lstStyle/>
+          <a:p>
+            <a:r>
+              <a:rPr lang="cs-CZ" dirty="0"/>
+              <a:t>Součástí druhého výstupu bylo vytvořit:</a:t>
+            </a:r>
+          </a:p>
+          <a:p>
+            <a:r>
+              <a:rPr lang="cs-CZ" dirty="0"/>
+              <a:t>6 pozadí/map</a:t>
+            </a:r>
+          </a:p>
+          <a:p>
+            <a:r>
+              <a:rPr lang="cs-CZ" dirty="0"/>
+              <a:t>4 základní typy postav</a:t>
+            </a:r>
+          </a:p>
+          <a:p>
+            <a:pPr marL="0" indent="0">
+              <a:buNone/>
+            </a:pPr>
+            <a:endParaRPr lang="cs-CZ" dirty="0"/>
+          </a:p>
+        </p:txBody>
+      </p:sp>
+    </p:spTree>
+    <p:extLst>
+      <p:ext uri="{BB962C8B-B14F-4D97-AF65-F5344CB8AC3E}">
+        <p14:creationId xmlns:p14="http://schemas.microsoft.com/office/powerpoint/2010/main" val="3655512158"/>
       </p:ext>
     </p:extLst>
   </p:cSld>

</xml_diff>